<commit_message>
修正Break Down 、FSM 、MSC
</commit_message>
<xml_diff>
--- a/Practice 1/練習題第一題_報告.pptx
+++ b/Practice 1/練習題第一題_報告.pptx
@@ -6,10 +6,9 @@
   </p:sldMasterIdLst>
   <p:sldIdLst>
     <p:sldId id="256" r:id="rId2"/>
-    <p:sldId id="257" r:id="rId3"/>
-    <p:sldId id="258" r:id="rId4"/>
-    <p:sldId id="259" r:id="rId5"/>
-    <p:sldId id="260" r:id="rId6"/>
+    <p:sldId id="258" r:id="rId3"/>
+    <p:sldId id="259" r:id="rId4"/>
+    <p:sldId id="260" r:id="rId5"/>
   </p:sldIdLst>
   <p:sldSz cx="12192000" cy="6858000"/>
   <p:notesSz cx="6858000" cy="9144000"/>
@@ -263,7 +262,7 @@
           <a:p>
             <a:fld id="{78904E8E-60A2-4B31-8C21-6CF5FFA9841B}" type="datetimeFigureOut">
               <a:rPr lang="zh-TW" altLang="en-US" smtClean="0"/>
-              <a:t>2025/11/20</a:t>
+              <a:t>2025/11/24</a:t>
             </a:fld>
             <a:endParaRPr lang="zh-TW" altLang="en-US"/>
           </a:p>
@@ -461,7 +460,7 @@
           <a:p>
             <a:fld id="{78904E8E-60A2-4B31-8C21-6CF5FFA9841B}" type="datetimeFigureOut">
               <a:rPr lang="zh-TW" altLang="en-US" smtClean="0"/>
-              <a:t>2025/11/20</a:t>
+              <a:t>2025/11/24</a:t>
             </a:fld>
             <a:endParaRPr lang="zh-TW" altLang="en-US"/>
           </a:p>
@@ -669,7 +668,7 @@
           <a:p>
             <a:fld id="{78904E8E-60A2-4B31-8C21-6CF5FFA9841B}" type="datetimeFigureOut">
               <a:rPr lang="zh-TW" altLang="en-US" smtClean="0"/>
-              <a:t>2025/11/20</a:t>
+              <a:t>2025/11/24</a:t>
             </a:fld>
             <a:endParaRPr lang="zh-TW" altLang="en-US"/>
           </a:p>
@@ -867,7 +866,7 @@
           <a:p>
             <a:fld id="{78904E8E-60A2-4B31-8C21-6CF5FFA9841B}" type="datetimeFigureOut">
               <a:rPr lang="zh-TW" altLang="en-US" smtClean="0"/>
-              <a:t>2025/11/20</a:t>
+              <a:t>2025/11/24</a:t>
             </a:fld>
             <a:endParaRPr lang="zh-TW" altLang="en-US"/>
           </a:p>
@@ -1142,7 +1141,7 @@
           <a:p>
             <a:fld id="{78904E8E-60A2-4B31-8C21-6CF5FFA9841B}" type="datetimeFigureOut">
               <a:rPr lang="zh-TW" altLang="en-US" smtClean="0"/>
-              <a:t>2025/11/20</a:t>
+              <a:t>2025/11/24</a:t>
             </a:fld>
             <a:endParaRPr lang="zh-TW" altLang="en-US"/>
           </a:p>
@@ -1407,7 +1406,7 @@
           <a:p>
             <a:fld id="{78904E8E-60A2-4B31-8C21-6CF5FFA9841B}" type="datetimeFigureOut">
               <a:rPr lang="zh-TW" altLang="en-US" smtClean="0"/>
-              <a:t>2025/11/20</a:t>
+              <a:t>2025/11/24</a:t>
             </a:fld>
             <a:endParaRPr lang="zh-TW" altLang="en-US"/>
           </a:p>
@@ -1819,7 +1818,7 @@
           <a:p>
             <a:fld id="{78904E8E-60A2-4B31-8C21-6CF5FFA9841B}" type="datetimeFigureOut">
               <a:rPr lang="zh-TW" altLang="en-US" smtClean="0"/>
-              <a:t>2025/11/20</a:t>
+              <a:t>2025/11/24</a:t>
             </a:fld>
             <a:endParaRPr lang="zh-TW" altLang="en-US"/>
           </a:p>
@@ -1960,7 +1959,7 @@
           <a:p>
             <a:fld id="{78904E8E-60A2-4B31-8C21-6CF5FFA9841B}" type="datetimeFigureOut">
               <a:rPr lang="zh-TW" altLang="en-US" smtClean="0"/>
-              <a:t>2025/11/20</a:t>
+              <a:t>2025/11/24</a:t>
             </a:fld>
             <a:endParaRPr lang="zh-TW" altLang="en-US"/>
           </a:p>
@@ -2073,7 +2072,7 @@
           <a:p>
             <a:fld id="{78904E8E-60A2-4B31-8C21-6CF5FFA9841B}" type="datetimeFigureOut">
               <a:rPr lang="zh-TW" altLang="en-US" smtClean="0"/>
-              <a:t>2025/11/20</a:t>
+              <a:t>2025/11/24</a:t>
             </a:fld>
             <a:endParaRPr lang="zh-TW" altLang="en-US"/>
           </a:p>
@@ -2384,7 +2383,7 @@
           <a:p>
             <a:fld id="{78904E8E-60A2-4B31-8C21-6CF5FFA9841B}" type="datetimeFigureOut">
               <a:rPr lang="zh-TW" altLang="en-US" smtClean="0"/>
-              <a:t>2025/11/20</a:t>
+              <a:t>2025/11/24</a:t>
             </a:fld>
             <a:endParaRPr lang="zh-TW" altLang="en-US"/>
           </a:p>
@@ -2672,7 +2671,7 @@
           <a:p>
             <a:fld id="{78904E8E-60A2-4B31-8C21-6CF5FFA9841B}" type="datetimeFigureOut">
               <a:rPr lang="zh-TW" altLang="en-US" smtClean="0"/>
-              <a:t>2025/11/20</a:t>
+              <a:t>2025/11/24</a:t>
             </a:fld>
             <a:endParaRPr lang="zh-TW" altLang="en-US"/>
           </a:p>
@@ -2913,7 +2912,7 @@
           <a:p>
             <a:fld id="{78904E8E-60A2-4B31-8C21-6CF5FFA9841B}" type="datetimeFigureOut">
               <a:rPr lang="zh-TW" altLang="en-US" smtClean="0"/>
-              <a:t>2025/11/20</a:t>
+              <a:t>2025/11/24</a:t>
             </a:fld>
             <a:endParaRPr lang="zh-TW" altLang="en-US"/>
           </a:p>
@@ -3332,10 +3331,10 @@
       </p:grpSpPr>
       <p:pic>
         <p:nvPicPr>
-          <p:cNvPr id="5" name="圖片 4">
-            <a:extLst>
-              <a:ext uri="{FF2B5EF4-FFF2-40B4-BE49-F238E27FC236}">
-                <a16:creationId xmlns:a16="http://schemas.microsoft.com/office/drawing/2014/main" id="{0083D939-8D2C-37C6-3DB9-E869000709C2}"/>
+          <p:cNvPr id="6" name="圖片 5">
+            <a:extLst>
+              <a:ext uri="{FF2B5EF4-FFF2-40B4-BE49-F238E27FC236}">
+                <a16:creationId xmlns:a16="http://schemas.microsoft.com/office/drawing/2014/main" id="{F3783736-44FE-F9A2-E793-14EBE4966DCC}"/>
               </a:ext>
             </a:extLst>
           </p:cNvPr>
@@ -3352,68 +3351,8 @@
         </p:blipFill>
         <p:spPr>
           <a:xfrm>
-            <a:off x="0" y="1014742"/>
-            <a:ext cx="12192000" cy="4828515"/>
-          </a:xfrm>
-          <a:prstGeom prst="rect">
-            <a:avLst/>
-          </a:prstGeom>
-        </p:spPr>
-      </p:pic>
-      <p:pic>
-        <p:nvPicPr>
-          <p:cNvPr id="3" name="圖片 2">
-            <a:extLst>
-              <a:ext uri="{FF2B5EF4-FFF2-40B4-BE49-F238E27FC236}">
-                <a16:creationId xmlns:a16="http://schemas.microsoft.com/office/drawing/2014/main" id="{172D8D75-72A8-59BD-A5C2-9B8F19E28B0E}"/>
-              </a:ext>
-            </a:extLst>
-          </p:cNvPr>
-          <p:cNvPicPr>
-            <a:picLocks noChangeAspect="1"/>
-          </p:cNvPicPr>
-          <p:nvPr/>
-        </p:nvPicPr>
-        <p:blipFill>
-          <a:blip r:embed="rId3"/>
-          <a:stretch>
-            <a:fillRect/>
-          </a:stretch>
-        </p:blipFill>
-        <p:spPr>
-          <a:xfrm>
-            <a:off x="0" y="726715"/>
-            <a:ext cx="12192000" cy="5404570"/>
-          </a:xfrm>
-          <a:prstGeom prst="rect">
-            <a:avLst/>
-          </a:prstGeom>
-        </p:spPr>
-      </p:pic>
-      <p:pic>
-        <p:nvPicPr>
-          <p:cNvPr id="4" name="圖片 3">
-            <a:extLst>
-              <a:ext uri="{FF2B5EF4-FFF2-40B4-BE49-F238E27FC236}">
-                <a16:creationId xmlns:a16="http://schemas.microsoft.com/office/drawing/2014/main" id="{8CC51DE4-54C5-D3F1-6658-757011EECB01}"/>
-              </a:ext>
-            </a:extLst>
-          </p:cNvPr>
-          <p:cNvPicPr>
-            <a:picLocks noChangeAspect="1"/>
-          </p:cNvPicPr>
-          <p:nvPr/>
-        </p:nvPicPr>
-        <p:blipFill>
-          <a:blip r:embed="rId4"/>
-          <a:stretch>
-            <a:fillRect/>
-          </a:stretch>
-        </p:blipFill>
-        <p:spPr>
-          <a:xfrm>
-            <a:off x="0" y="704210"/>
-            <a:ext cx="12192000" cy="5449579"/>
+            <a:off x="0" y="1072602"/>
+            <a:ext cx="12192000" cy="4712795"/>
           </a:xfrm>
           <a:prstGeom prst="rect">
             <a:avLst/>
@@ -3452,10 +3391,10 @@
       </p:grpSpPr>
       <p:pic>
         <p:nvPicPr>
-          <p:cNvPr id="5" name="圖片 4">
-            <a:extLst>
-              <a:ext uri="{FF2B5EF4-FFF2-40B4-BE49-F238E27FC236}">
-                <a16:creationId xmlns:a16="http://schemas.microsoft.com/office/drawing/2014/main" id="{70A0B580-5796-4429-A2C6-2E492D00FA75}"/>
+          <p:cNvPr id="3" name="圖片 2">
+            <a:extLst>
+              <a:ext uri="{FF2B5EF4-FFF2-40B4-BE49-F238E27FC236}">
+                <a16:creationId xmlns:a16="http://schemas.microsoft.com/office/drawing/2014/main" id="{DE1F2CCB-E9FD-3132-F526-B3457F65A14B}"/>
               </a:ext>
             </a:extLst>
           </p:cNvPr>
@@ -3472,8 +3411,8 @@
         </p:blipFill>
         <p:spPr>
           <a:xfrm>
-            <a:off x="517016" y="0"/>
-            <a:ext cx="11157967" cy="6858000"/>
+            <a:off x="0" y="849228"/>
+            <a:ext cx="12192000" cy="5159543"/>
           </a:xfrm>
           <a:prstGeom prst="rect">
             <a:avLst/>
@@ -3483,7 +3422,7 @@
     </p:spTree>
     <p:extLst>
       <p:ext uri="{BB962C8B-B14F-4D97-AF65-F5344CB8AC3E}">
-        <p14:creationId xmlns:p14="http://schemas.microsoft.com/office/powerpoint/2010/main" val="1442035352"/>
+        <p14:creationId xmlns:p14="http://schemas.microsoft.com/office/powerpoint/2010/main" val="2972536480"/>
       </p:ext>
     </p:extLst>
   </p:cSld>
@@ -3512,10 +3451,10 @@
       </p:grpSpPr>
       <p:pic>
         <p:nvPicPr>
-          <p:cNvPr id="5" name="圖片 4">
-            <a:extLst>
-              <a:ext uri="{FF2B5EF4-FFF2-40B4-BE49-F238E27FC236}">
-                <a16:creationId xmlns:a16="http://schemas.microsoft.com/office/drawing/2014/main" id="{5F5584A7-FE4E-BFBB-C664-9F849369A3CA}"/>
+          <p:cNvPr id="3" name="圖片 2">
+            <a:extLst>
+              <a:ext uri="{FF2B5EF4-FFF2-40B4-BE49-F238E27FC236}">
+                <a16:creationId xmlns:a16="http://schemas.microsoft.com/office/drawing/2014/main" id="{579E73BA-9C7E-E12A-3428-FD733D9CBC09}"/>
               </a:ext>
             </a:extLst>
           </p:cNvPr>
@@ -3532,68 +3471,8 @@
         </p:blipFill>
         <p:spPr>
           <a:xfrm>
-            <a:off x="0" y="381000"/>
-            <a:ext cx="12192000" cy="6096000"/>
-          </a:xfrm>
-          <a:prstGeom prst="rect">
-            <a:avLst/>
-          </a:prstGeom>
-        </p:spPr>
-      </p:pic>
-    </p:spTree>
-    <p:extLst>
-      <p:ext uri="{BB962C8B-B14F-4D97-AF65-F5344CB8AC3E}">
-        <p14:creationId xmlns:p14="http://schemas.microsoft.com/office/powerpoint/2010/main" val="2972536480"/>
-      </p:ext>
-    </p:extLst>
-  </p:cSld>
-  <p:clrMapOvr>
-    <a:masterClrMapping/>
-  </p:clrMapOvr>
-</p:sld>
-</file>
-
-<file path=ppt/slides/slide4.xml><?xml version="1.0" encoding="utf-8"?>
-<p:sld xmlns:a="http://schemas.openxmlformats.org/drawingml/2006/main" xmlns:r="http://schemas.openxmlformats.org/officeDocument/2006/relationships" xmlns:p="http://schemas.openxmlformats.org/presentationml/2006/main">
-  <p:cSld>
-    <p:spTree>
-      <p:nvGrpSpPr>
-        <p:cNvPr id="1" name=""/>
-        <p:cNvGrpSpPr/>
-        <p:nvPr/>
-      </p:nvGrpSpPr>
-      <p:grpSpPr>
-        <a:xfrm>
-          <a:off x="0" y="0"/>
-          <a:ext cx="0" cy="0"/>
-          <a:chOff x="0" y="0"/>
-          <a:chExt cx="0" cy="0"/>
-        </a:xfrm>
-      </p:grpSpPr>
-      <p:pic>
-        <p:nvPicPr>
-          <p:cNvPr id="5" name="圖片 4">
-            <a:extLst>
-              <a:ext uri="{FF2B5EF4-FFF2-40B4-BE49-F238E27FC236}">
-                <a16:creationId xmlns:a16="http://schemas.microsoft.com/office/drawing/2014/main" id="{1E244971-BFAE-8D66-73FB-6D7003A50118}"/>
-              </a:ext>
-            </a:extLst>
-          </p:cNvPr>
-          <p:cNvPicPr>
-            <a:picLocks noChangeAspect="1"/>
-          </p:cNvPicPr>
-          <p:nvPr/>
-        </p:nvPicPr>
-        <p:blipFill>
-          <a:blip r:embed="rId2"/>
-          <a:stretch>
-            <a:fillRect/>
-          </a:stretch>
-        </p:blipFill>
-        <p:spPr>
-          <a:xfrm>
-            <a:off x="1055369" y="0"/>
-            <a:ext cx="10081261" cy="6858000"/>
+            <a:off x="0" y="411178"/>
+            <a:ext cx="12192000" cy="6035643"/>
           </a:xfrm>
           <a:prstGeom prst="rect">
             <a:avLst/>
@@ -3613,7 +3492,7 @@
 </p:sld>
 </file>
 
-<file path=ppt/slides/slide5.xml><?xml version="1.0" encoding="utf-8"?>
+<file path=ppt/slides/slide4.xml><?xml version="1.0" encoding="utf-8"?>
 <p:sld xmlns:a="http://schemas.openxmlformats.org/drawingml/2006/main" xmlns:r="http://schemas.openxmlformats.org/officeDocument/2006/relationships" xmlns:p="http://schemas.openxmlformats.org/presentationml/2006/main">
   <p:cSld>
     <p:spTree>

</xml_diff>